<commit_message>
(v1.4) UG Guide for File Protection
Provided description for Encrypt Command.
</commit_message>
<xml_diff>
--- a/docs/diagrams/EncryptFeatureFileCheck.pptx
+++ b/docs/diagrams/EncryptFeatureFileCheck.pptx
@@ -109,6 +109,11 @@
       </a:defRPr>
     </a:lvl9pPr>
   </p:defaultTextStyle>
+  <p:extLst>
+    <p:ext uri="{EFAFB233-063F-42B5-8137-9DF3F51BA10A}">
+      <p15:sldGuideLst xmlns:p15="http://schemas.microsoft.com/office/powerpoint/2012/main"/>
+    </p:ext>
+  </p:extLst>
 </p:presentation>
 </file>
 
@@ -261,7 +266,7 @@
           <a:p>
             <a:fld id="{8FAE4562-6618-4DDB-846B-E1E69631F01E}" type="datetimeFigureOut">
               <a:rPr lang="en-SG" smtClean="0"/>
-              <a:t>1/4/2019</a:t>
+              <a:t>14/4/2019</a:t>
             </a:fld>
             <a:endParaRPr lang="en-SG"/>
           </a:p>
@@ -461,7 +466,7 @@
           <a:p>
             <a:fld id="{8FAE4562-6618-4DDB-846B-E1E69631F01E}" type="datetimeFigureOut">
               <a:rPr lang="en-SG" smtClean="0"/>
-              <a:t>1/4/2019</a:t>
+              <a:t>14/4/2019</a:t>
             </a:fld>
             <a:endParaRPr lang="en-SG"/>
           </a:p>
@@ -671,7 +676,7 @@
           <a:p>
             <a:fld id="{8FAE4562-6618-4DDB-846B-E1E69631F01E}" type="datetimeFigureOut">
               <a:rPr lang="en-SG" smtClean="0"/>
-              <a:t>1/4/2019</a:t>
+              <a:t>14/4/2019</a:t>
             </a:fld>
             <a:endParaRPr lang="en-SG"/>
           </a:p>
@@ -871,7 +876,7 @@
           <a:p>
             <a:fld id="{8FAE4562-6618-4DDB-846B-E1E69631F01E}" type="datetimeFigureOut">
               <a:rPr lang="en-SG" smtClean="0"/>
-              <a:t>1/4/2019</a:t>
+              <a:t>14/4/2019</a:t>
             </a:fld>
             <a:endParaRPr lang="en-SG"/>
           </a:p>
@@ -1147,7 +1152,7 @@
           <a:p>
             <a:fld id="{8FAE4562-6618-4DDB-846B-E1E69631F01E}" type="datetimeFigureOut">
               <a:rPr lang="en-SG" smtClean="0"/>
-              <a:t>1/4/2019</a:t>
+              <a:t>14/4/2019</a:t>
             </a:fld>
             <a:endParaRPr lang="en-SG"/>
           </a:p>
@@ -1415,7 +1420,7 @@
           <a:p>
             <a:fld id="{8FAE4562-6618-4DDB-846B-E1E69631F01E}" type="datetimeFigureOut">
               <a:rPr lang="en-SG" smtClean="0"/>
-              <a:t>1/4/2019</a:t>
+              <a:t>14/4/2019</a:t>
             </a:fld>
             <a:endParaRPr lang="en-SG"/>
           </a:p>
@@ -1830,7 +1835,7 @@
           <a:p>
             <a:fld id="{8FAE4562-6618-4DDB-846B-E1E69631F01E}" type="datetimeFigureOut">
               <a:rPr lang="en-SG" smtClean="0"/>
-              <a:t>1/4/2019</a:t>
+              <a:t>14/4/2019</a:t>
             </a:fld>
             <a:endParaRPr lang="en-SG"/>
           </a:p>
@@ -1972,7 +1977,7 @@
           <a:p>
             <a:fld id="{8FAE4562-6618-4DDB-846B-E1E69631F01E}" type="datetimeFigureOut">
               <a:rPr lang="en-SG" smtClean="0"/>
-              <a:t>1/4/2019</a:t>
+              <a:t>14/4/2019</a:t>
             </a:fld>
             <a:endParaRPr lang="en-SG"/>
           </a:p>
@@ -2085,7 +2090,7 @@
           <a:p>
             <a:fld id="{8FAE4562-6618-4DDB-846B-E1E69631F01E}" type="datetimeFigureOut">
               <a:rPr lang="en-SG" smtClean="0"/>
-              <a:t>1/4/2019</a:t>
+              <a:t>14/4/2019</a:t>
             </a:fld>
             <a:endParaRPr lang="en-SG"/>
           </a:p>
@@ -2398,7 +2403,7 @@
           <a:p>
             <a:fld id="{8FAE4562-6618-4DDB-846B-E1E69631F01E}" type="datetimeFigureOut">
               <a:rPr lang="en-SG" smtClean="0"/>
-              <a:t>1/4/2019</a:t>
+              <a:t>14/4/2019</a:t>
             </a:fld>
             <a:endParaRPr lang="en-SG"/>
           </a:p>
@@ -2687,7 +2692,7 @@
           <a:p>
             <a:fld id="{8FAE4562-6618-4DDB-846B-E1E69631F01E}" type="datetimeFigureOut">
               <a:rPr lang="en-SG" smtClean="0"/>
-              <a:t>1/4/2019</a:t>
+              <a:t>14/4/2019</a:t>
             </a:fld>
             <a:endParaRPr lang="en-SG"/>
           </a:p>
@@ -2930,7 +2935,7 @@
           <a:p>
             <a:fld id="{8FAE4562-6618-4DDB-846B-E1E69631F01E}" type="datetimeFigureOut">
               <a:rPr lang="en-SG" smtClean="0"/>
-              <a:t>1/4/2019</a:t>
+              <a:t>14/4/2019</a:t>
             </a:fld>
             <a:endParaRPr lang="en-SG"/>
           </a:p>
@@ -3349,10 +3354,10 @@
       </p:grpSpPr>
       <p:pic>
         <p:nvPicPr>
-          <p:cNvPr id="4" name="Picture 3">
-            <a:extLst>
-              <a:ext uri="{FF2B5EF4-FFF2-40B4-BE49-F238E27FC236}">
-                <a16:creationId xmlns:a16="http://schemas.microsoft.com/office/drawing/2014/main" id="{FA84CC1B-2B49-4454-8A3D-5812B5D2B83A}"/>
+          <p:cNvPr id="2" name="Picture 1">
+            <a:extLst>
+              <a:ext uri="{FF2B5EF4-FFF2-40B4-BE49-F238E27FC236}">
+                <a16:creationId xmlns:a16="http://schemas.microsoft.com/office/drawing/2014/main" id="{FDAA5EED-79FF-4E9B-81D2-6ABEA2813082}"/>
               </a:ext>
             </a:extLst>
           </p:cNvPr>
@@ -3369,8 +3374,8 @@
         </p:blipFill>
         <p:spPr>
           <a:xfrm>
-            <a:off x="2302229" y="141428"/>
-            <a:ext cx="7587541" cy="6575143"/>
+            <a:off x="2589353" y="0"/>
+            <a:ext cx="7013294" cy="6858000"/>
           </a:xfrm>
           <a:prstGeom prst="rect">
             <a:avLst/>
@@ -3409,10 +3414,10 @@
       </p:grpSpPr>
       <p:pic>
         <p:nvPicPr>
-          <p:cNvPr id="7" name="Picture 6">
-            <a:extLst>
-              <a:ext uri="{FF2B5EF4-FFF2-40B4-BE49-F238E27FC236}">
-                <a16:creationId xmlns:a16="http://schemas.microsoft.com/office/drawing/2014/main" id="{C6A59D7C-136A-47CE-844C-E943D0227580}"/>
+          <p:cNvPr id="11" name="Picture 10">
+            <a:extLst>
+              <a:ext uri="{FF2B5EF4-FFF2-40B4-BE49-F238E27FC236}">
+                <a16:creationId xmlns:a16="http://schemas.microsoft.com/office/drawing/2014/main" id="{94F0DBB4-B374-467D-B6FD-EF85599BDD01}"/>
               </a:ext>
             </a:extLst>
           </p:cNvPr>
@@ -3429,8 +3434,8 @@
         </p:blipFill>
         <p:spPr>
           <a:xfrm>
-            <a:off x="2302229" y="141428"/>
-            <a:ext cx="7587541" cy="6575143"/>
+            <a:off x="2589353" y="0"/>
+            <a:ext cx="7013294" cy="6858000"/>
           </a:xfrm>
           <a:prstGeom prst="rect">
             <a:avLst/>
@@ -3451,7 +3456,7 @@
         </p:nvSpPr>
         <p:spPr>
           <a:xfrm>
-            <a:off x="2445488" y="1013637"/>
+            <a:off x="2700670" y="677475"/>
             <a:ext cx="297712" cy="368596"/>
           </a:xfrm>
           <a:prstGeom prst="ellipse">
@@ -3502,8 +3507,8 @@
           <p:nvPr/>
         </p:nvSpPr>
         <p:spPr>
-          <a:xfrm rot="9176595">
-            <a:off x="2703623" y="640461"/>
+          <a:xfrm rot="9754023">
+            <a:off x="3021199" y="290604"/>
             <a:ext cx="1071689" cy="420288"/>
           </a:xfrm>
           <a:prstGeom prst="rightArrow">
@@ -3549,7 +3554,7 @@
         </p:nvSpPr>
         <p:spPr>
           <a:xfrm>
-            <a:off x="3812257" y="481273"/>
+            <a:off x="4131233" y="308143"/>
             <a:ext cx="3624710" cy="369332"/>
           </a:xfrm>
           <a:prstGeom prst="rect">
@@ -3606,10 +3611,10 @@
       </p:grpSpPr>
       <p:pic>
         <p:nvPicPr>
-          <p:cNvPr id="4" name="Picture 3">
-            <a:extLst>
-              <a:ext uri="{FF2B5EF4-FFF2-40B4-BE49-F238E27FC236}">
-                <a16:creationId xmlns:a16="http://schemas.microsoft.com/office/drawing/2014/main" id="{B36CB239-847A-486D-866D-139F8268FFF4}"/>
+          <p:cNvPr id="2" name="Picture 1">
+            <a:extLst>
+              <a:ext uri="{FF2B5EF4-FFF2-40B4-BE49-F238E27FC236}">
+                <a16:creationId xmlns:a16="http://schemas.microsoft.com/office/drawing/2014/main" id="{D0C40FB8-25CD-4E37-A6EA-9163DD6A8599}"/>
               </a:ext>
             </a:extLst>
           </p:cNvPr>
@@ -3620,13 +3625,13 @@
         </p:nvPicPr>
         <p:blipFill rotWithShape="1">
           <a:blip r:embed="rId2"/>
-          <a:srcRect l="16349" t="5238" r="19259" b="11270"/>
+          <a:srcRect r="265"/>
           <a:stretch/>
         </p:blipFill>
         <p:spPr>
           <a:xfrm>
-            <a:off x="2634343" y="359229"/>
-            <a:ext cx="6623958" cy="5725886"/>
+            <a:off x="2597020" y="0"/>
+            <a:ext cx="6979371" cy="6858000"/>
           </a:xfrm>
           <a:prstGeom prst="rect">
             <a:avLst/>
@@ -3647,7 +3652,7 @@
         </p:nvSpPr>
         <p:spPr>
           <a:xfrm rot="14979645">
-            <a:off x="3669299" y="4797579"/>
+            <a:off x="4037894" y="5470974"/>
             <a:ext cx="1071689" cy="420288"/>
           </a:xfrm>
           <a:prstGeom prst="rightArrow">
@@ -3693,7 +3698,7 @@
         </p:nvSpPr>
         <p:spPr>
           <a:xfrm>
-            <a:off x="4643755" y="5213868"/>
+            <a:off x="4957029" y="5496452"/>
             <a:ext cx="4431983" cy="369332"/>
           </a:xfrm>
           <a:prstGeom prst="rect">
@@ -3748,6 +3753,36 @@
           <a:chExt cx="0" cy="0"/>
         </a:xfrm>
       </p:grpSpPr>
+      <p:pic>
+        <p:nvPicPr>
+          <p:cNvPr id="3" name="Picture 2">
+            <a:extLst>
+              <a:ext uri="{FF2B5EF4-FFF2-40B4-BE49-F238E27FC236}">
+                <a16:creationId xmlns:a16="http://schemas.microsoft.com/office/drawing/2014/main" id="{87810579-1EF5-4DC6-AB4C-D1FFD0FBEF7F}"/>
+              </a:ext>
+            </a:extLst>
+          </p:cNvPr>
+          <p:cNvPicPr>
+            <a:picLocks noChangeAspect="1"/>
+          </p:cNvPicPr>
+          <p:nvPr/>
+        </p:nvPicPr>
+        <p:blipFill>
+          <a:blip r:embed="rId2"/>
+          <a:stretch>
+            <a:fillRect/>
+          </a:stretch>
+        </p:blipFill>
+        <p:spPr>
+          <a:xfrm>
+            <a:off x="2302229" y="2318628"/>
+            <a:ext cx="7587541" cy="2220744"/>
+          </a:xfrm>
+          <a:prstGeom prst="rect">
+            <a:avLst/>
+          </a:prstGeom>
+        </p:spPr>
+      </p:pic>
     </p:spTree>
     <p:extLst>
       <p:ext uri="{BB962C8B-B14F-4D97-AF65-F5344CB8AC3E}">

</xml_diff>

<commit_message>
File Protection UG images
</commit_message>
<xml_diff>
--- a/docs/diagrams/EncryptFeatureFileCheck.pptx
+++ b/docs/diagrams/EncryptFeatureFileCheck.pptx
@@ -11,6 +11,8 @@
     <p:sldId id="261" r:id="rId5"/>
     <p:sldId id="259" r:id="rId6"/>
     <p:sldId id="260" r:id="rId7"/>
+    <p:sldId id="263" r:id="rId8"/>
+    <p:sldId id="264" r:id="rId9"/>
   </p:sldIdLst>
   <p:sldSz cx="12192000" cy="6858000"/>
   <p:notesSz cx="6858000" cy="9144000"/>
@@ -109,6 +111,11 @@
       </a:defRPr>
     </a:lvl9pPr>
   </p:defaultTextStyle>
+  <p:extLst>
+    <p:ext uri="{EFAFB233-063F-42B5-8137-9DF3F51BA10A}">
+      <p15:sldGuideLst xmlns:p15="http://schemas.microsoft.com/office/powerpoint/2012/main"/>
+    </p:ext>
+  </p:extLst>
 </p:presentation>
 </file>
 
@@ -261,7 +268,7 @@
           <a:p>
             <a:fld id="{8FAE4562-6618-4DDB-846B-E1E69631F01E}" type="datetimeFigureOut">
               <a:rPr lang="en-SG" smtClean="0"/>
-              <a:t>1/4/2019</a:t>
+              <a:t>14/4/2019</a:t>
             </a:fld>
             <a:endParaRPr lang="en-SG"/>
           </a:p>
@@ -461,7 +468,7 @@
           <a:p>
             <a:fld id="{8FAE4562-6618-4DDB-846B-E1E69631F01E}" type="datetimeFigureOut">
               <a:rPr lang="en-SG" smtClean="0"/>
-              <a:t>1/4/2019</a:t>
+              <a:t>14/4/2019</a:t>
             </a:fld>
             <a:endParaRPr lang="en-SG"/>
           </a:p>
@@ -671,7 +678,7 @@
           <a:p>
             <a:fld id="{8FAE4562-6618-4DDB-846B-E1E69631F01E}" type="datetimeFigureOut">
               <a:rPr lang="en-SG" smtClean="0"/>
-              <a:t>1/4/2019</a:t>
+              <a:t>14/4/2019</a:t>
             </a:fld>
             <a:endParaRPr lang="en-SG"/>
           </a:p>
@@ -871,7 +878,7 @@
           <a:p>
             <a:fld id="{8FAE4562-6618-4DDB-846B-E1E69631F01E}" type="datetimeFigureOut">
               <a:rPr lang="en-SG" smtClean="0"/>
-              <a:t>1/4/2019</a:t>
+              <a:t>14/4/2019</a:t>
             </a:fld>
             <a:endParaRPr lang="en-SG"/>
           </a:p>
@@ -1147,7 +1154,7 @@
           <a:p>
             <a:fld id="{8FAE4562-6618-4DDB-846B-E1E69631F01E}" type="datetimeFigureOut">
               <a:rPr lang="en-SG" smtClean="0"/>
-              <a:t>1/4/2019</a:t>
+              <a:t>14/4/2019</a:t>
             </a:fld>
             <a:endParaRPr lang="en-SG"/>
           </a:p>
@@ -1415,7 +1422,7 @@
           <a:p>
             <a:fld id="{8FAE4562-6618-4DDB-846B-E1E69631F01E}" type="datetimeFigureOut">
               <a:rPr lang="en-SG" smtClean="0"/>
-              <a:t>1/4/2019</a:t>
+              <a:t>14/4/2019</a:t>
             </a:fld>
             <a:endParaRPr lang="en-SG"/>
           </a:p>
@@ -1830,7 +1837,7 @@
           <a:p>
             <a:fld id="{8FAE4562-6618-4DDB-846B-E1E69631F01E}" type="datetimeFigureOut">
               <a:rPr lang="en-SG" smtClean="0"/>
-              <a:t>1/4/2019</a:t>
+              <a:t>14/4/2019</a:t>
             </a:fld>
             <a:endParaRPr lang="en-SG"/>
           </a:p>
@@ -1972,7 +1979,7 @@
           <a:p>
             <a:fld id="{8FAE4562-6618-4DDB-846B-E1E69631F01E}" type="datetimeFigureOut">
               <a:rPr lang="en-SG" smtClean="0"/>
-              <a:t>1/4/2019</a:t>
+              <a:t>14/4/2019</a:t>
             </a:fld>
             <a:endParaRPr lang="en-SG"/>
           </a:p>
@@ -2085,7 +2092,7 @@
           <a:p>
             <a:fld id="{8FAE4562-6618-4DDB-846B-E1E69631F01E}" type="datetimeFigureOut">
               <a:rPr lang="en-SG" smtClean="0"/>
-              <a:t>1/4/2019</a:t>
+              <a:t>14/4/2019</a:t>
             </a:fld>
             <a:endParaRPr lang="en-SG"/>
           </a:p>
@@ -2398,7 +2405,7 @@
           <a:p>
             <a:fld id="{8FAE4562-6618-4DDB-846B-E1E69631F01E}" type="datetimeFigureOut">
               <a:rPr lang="en-SG" smtClean="0"/>
-              <a:t>1/4/2019</a:t>
+              <a:t>14/4/2019</a:t>
             </a:fld>
             <a:endParaRPr lang="en-SG"/>
           </a:p>
@@ -2687,7 +2694,7 @@
           <a:p>
             <a:fld id="{8FAE4562-6618-4DDB-846B-E1E69631F01E}" type="datetimeFigureOut">
               <a:rPr lang="en-SG" smtClean="0"/>
-              <a:t>1/4/2019</a:t>
+              <a:t>14/4/2019</a:t>
             </a:fld>
             <a:endParaRPr lang="en-SG"/>
           </a:p>
@@ -2930,7 +2937,7 @@
           <a:p>
             <a:fld id="{8FAE4562-6618-4DDB-846B-E1E69631F01E}" type="datetimeFigureOut">
               <a:rPr lang="en-SG" smtClean="0"/>
-              <a:t>1/4/2019</a:t>
+              <a:t>14/4/2019</a:t>
             </a:fld>
             <a:endParaRPr lang="en-SG"/>
           </a:p>
@@ -3349,10 +3356,10 @@
       </p:grpSpPr>
       <p:pic>
         <p:nvPicPr>
-          <p:cNvPr id="4" name="Picture 3">
-            <a:extLst>
-              <a:ext uri="{FF2B5EF4-FFF2-40B4-BE49-F238E27FC236}">
-                <a16:creationId xmlns:a16="http://schemas.microsoft.com/office/drawing/2014/main" id="{FA84CC1B-2B49-4454-8A3D-5812B5D2B83A}"/>
+          <p:cNvPr id="2" name="Picture 1">
+            <a:extLst>
+              <a:ext uri="{FF2B5EF4-FFF2-40B4-BE49-F238E27FC236}">
+                <a16:creationId xmlns:a16="http://schemas.microsoft.com/office/drawing/2014/main" id="{FDAA5EED-79FF-4E9B-81D2-6ABEA2813082}"/>
               </a:ext>
             </a:extLst>
           </p:cNvPr>
@@ -3369,8 +3376,8 @@
         </p:blipFill>
         <p:spPr>
           <a:xfrm>
-            <a:off x="2302229" y="141428"/>
-            <a:ext cx="7587541" cy="6575143"/>
+            <a:off x="2589353" y="0"/>
+            <a:ext cx="7013294" cy="6858000"/>
           </a:xfrm>
           <a:prstGeom prst="rect">
             <a:avLst/>
@@ -3409,10 +3416,10 @@
       </p:grpSpPr>
       <p:pic>
         <p:nvPicPr>
-          <p:cNvPr id="7" name="Picture 6">
-            <a:extLst>
-              <a:ext uri="{FF2B5EF4-FFF2-40B4-BE49-F238E27FC236}">
-                <a16:creationId xmlns:a16="http://schemas.microsoft.com/office/drawing/2014/main" id="{C6A59D7C-136A-47CE-844C-E943D0227580}"/>
+          <p:cNvPr id="11" name="Picture 10">
+            <a:extLst>
+              <a:ext uri="{FF2B5EF4-FFF2-40B4-BE49-F238E27FC236}">
+                <a16:creationId xmlns:a16="http://schemas.microsoft.com/office/drawing/2014/main" id="{94F0DBB4-B374-467D-B6FD-EF85599BDD01}"/>
               </a:ext>
             </a:extLst>
           </p:cNvPr>
@@ -3429,8 +3436,8 @@
         </p:blipFill>
         <p:spPr>
           <a:xfrm>
-            <a:off x="2302229" y="141428"/>
-            <a:ext cx="7587541" cy="6575143"/>
+            <a:off x="2589353" y="0"/>
+            <a:ext cx="7013294" cy="6858000"/>
           </a:xfrm>
           <a:prstGeom prst="rect">
             <a:avLst/>
@@ -3451,7 +3458,7 @@
         </p:nvSpPr>
         <p:spPr>
           <a:xfrm>
-            <a:off x="2445488" y="1013637"/>
+            <a:off x="2700670" y="677475"/>
             <a:ext cx="297712" cy="368596"/>
           </a:xfrm>
           <a:prstGeom prst="ellipse">
@@ -3502,8 +3509,8 @@
           <p:nvPr/>
         </p:nvSpPr>
         <p:spPr>
-          <a:xfrm rot="9176595">
-            <a:off x="2703623" y="640461"/>
+          <a:xfrm rot="9754023">
+            <a:off x="3021199" y="290604"/>
             <a:ext cx="1071689" cy="420288"/>
           </a:xfrm>
           <a:prstGeom prst="rightArrow">
@@ -3549,7 +3556,7 @@
         </p:nvSpPr>
         <p:spPr>
           <a:xfrm>
-            <a:off x="3812257" y="481273"/>
+            <a:off x="4131233" y="308143"/>
             <a:ext cx="3624710" cy="369332"/>
           </a:xfrm>
           <a:prstGeom prst="rect">
@@ -3606,10 +3613,10 @@
       </p:grpSpPr>
       <p:pic>
         <p:nvPicPr>
-          <p:cNvPr id="4" name="Picture 3">
-            <a:extLst>
-              <a:ext uri="{FF2B5EF4-FFF2-40B4-BE49-F238E27FC236}">
-                <a16:creationId xmlns:a16="http://schemas.microsoft.com/office/drawing/2014/main" id="{B36CB239-847A-486D-866D-139F8268FFF4}"/>
+          <p:cNvPr id="2" name="Picture 1">
+            <a:extLst>
+              <a:ext uri="{FF2B5EF4-FFF2-40B4-BE49-F238E27FC236}">
+                <a16:creationId xmlns:a16="http://schemas.microsoft.com/office/drawing/2014/main" id="{D0C40FB8-25CD-4E37-A6EA-9163DD6A8599}"/>
               </a:ext>
             </a:extLst>
           </p:cNvPr>
@@ -3620,13 +3627,13 @@
         </p:nvPicPr>
         <p:blipFill rotWithShape="1">
           <a:blip r:embed="rId2"/>
-          <a:srcRect l="16349" t="5238" r="19259" b="11270"/>
+          <a:srcRect r="265"/>
           <a:stretch/>
         </p:blipFill>
         <p:spPr>
           <a:xfrm>
-            <a:off x="2634343" y="359229"/>
-            <a:ext cx="6623958" cy="5725886"/>
+            <a:off x="2597020" y="0"/>
+            <a:ext cx="6979371" cy="6858000"/>
           </a:xfrm>
           <a:prstGeom prst="rect">
             <a:avLst/>
@@ -3647,7 +3654,7 @@
         </p:nvSpPr>
         <p:spPr>
           <a:xfrm rot="14979645">
-            <a:off x="3669299" y="4797579"/>
+            <a:off x="4037894" y="5470974"/>
             <a:ext cx="1071689" cy="420288"/>
           </a:xfrm>
           <a:prstGeom prst="rightArrow">
@@ -3693,7 +3700,7 @@
         </p:nvSpPr>
         <p:spPr>
           <a:xfrm>
-            <a:off x="4643755" y="5213868"/>
+            <a:off x="4957029" y="5496452"/>
             <a:ext cx="4431983" cy="369332"/>
           </a:xfrm>
           <a:prstGeom prst="rect">
@@ -3748,6 +3755,121 @@
           <a:chExt cx="0" cy="0"/>
         </a:xfrm>
       </p:grpSpPr>
+      <p:pic>
+        <p:nvPicPr>
+          <p:cNvPr id="2" name="Picture 1">
+            <a:extLst>
+              <a:ext uri="{FF2B5EF4-FFF2-40B4-BE49-F238E27FC236}">
+                <a16:creationId xmlns:a16="http://schemas.microsoft.com/office/drawing/2014/main" id="{18D6FC79-BBCB-4338-B8AF-2A096CE8B80A}"/>
+              </a:ext>
+            </a:extLst>
+          </p:cNvPr>
+          <p:cNvPicPr>
+            <a:picLocks noChangeAspect="1"/>
+          </p:cNvPicPr>
+          <p:nvPr/>
+        </p:nvPicPr>
+        <p:blipFill>
+          <a:blip r:embed="rId2"/>
+          <a:stretch>
+            <a:fillRect/>
+          </a:stretch>
+        </p:blipFill>
+        <p:spPr>
+          <a:xfrm>
+            <a:off x="2283179" y="2318628"/>
+            <a:ext cx="7625642" cy="2220744"/>
+          </a:xfrm>
+          <a:prstGeom prst="rect">
+            <a:avLst/>
+          </a:prstGeom>
+        </p:spPr>
+      </p:pic>
+      <p:sp>
+        <p:nvSpPr>
+          <p:cNvPr id="4" name="Arrow: Right 3">
+            <a:extLst>
+              <a:ext uri="{FF2B5EF4-FFF2-40B4-BE49-F238E27FC236}">
+                <a16:creationId xmlns:a16="http://schemas.microsoft.com/office/drawing/2014/main" id="{3641B00A-A9FA-4048-8FF7-BA62EB705EE2}"/>
+              </a:ext>
+            </a:extLst>
+          </p:cNvPr>
+          <p:cNvSpPr/>
+          <p:nvPr/>
+        </p:nvSpPr>
+        <p:spPr>
+          <a:xfrm rot="11777968">
+            <a:off x="3796887" y="2642715"/>
+            <a:ext cx="1071689" cy="420288"/>
+          </a:xfrm>
+          <a:prstGeom prst="rightArrow">
+            <a:avLst/>
+          </a:prstGeom>
+        </p:spPr>
+        <p:style>
+          <a:lnRef idx="2">
+            <a:schemeClr val="accent1">
+              <a:shade val="50000"/>
+            </a:schemeClr>
+          </a:lnRef>
+          <a:fillRef idx="1">
+            <a:schemeClr val="accent1"/>
+          </a:fillRef>
+          <a:effectRef idx="0">
+            <a:schemeClr val="accent1"/>
+          </a:effectRef>
+          <a:fontRef idx="minor">
+            <a:schemeClr val="lt1"/>
+          </a:fontRef>
+        </p:style>
+        <p:txBody>
+          <a:bodyPr rtlCol="0" anchor="ctr"/>
+          <a:lstStyle/>
+          <a:p>
+            <a:pPr algn="ctr"/>
+            <a:endParaRPr lang="en-SG"/>
+          </a:p>
+        </p:txBody>
+      </p:sp>
+      <p:sp>
+        <p:nvSpPr>
+          <p:cNvPr id="5" name="TextBox 4">
+            <a:extLst>
+              <a:ext uri="{FF2B5EF4-FFF2-40B4-BE49-F238E27FC236}">
+                <a16:creationId xmlns:a16="http://schemas.microsoft.com/office/drawing/2014/main" id="{7E10194B-52CD-421F-80A1-6ADE714EA72D}"/>
+              </a:ext>
+            </a:extLst>
+          </p:cNvPr>
+          <p:cNvSpPr txBox="1"/>
+          <p:nvPr/>
+        </p:nvSpPr>
+        <p:spPr>
+          <a:xfrm>
+            <a:off x="4906018" y="2852859"/>
+            <a:ext cx="1494320" cy="369332"/>
+          </a:xfrm>
+          <a:prstGeom prst="rect">
+            <a:avLst/>
+          </a:prstGeom>
+          <a:noFill/>
+        </p:spPr>
+        <p:txBody>
+          <a:bodyPr wrap="none" rtlCol="0">
+            <a:spAutoFit/>
+          </a:bodyPr>
+          <a:lstStyle/>
+          <a:p>
+            <a:r>
+              <a:rPr lang="en-SG" dirty="0">
+                <a:solidFill>
+                  <a:schemeClr val="bg1"/>
+                </a:solidFill>
+              </a:rPr>
+              <a:t>Not a number</a:t>
+            </a:r>
+          </a:p>
+        </p:txBody>
+      </p:sp>
     </p:spTree>
     <p:extLst>
       <p:ext uri="{BB962C8B-B14F-4D97-AF65-F5344CB8AC3E}">
@@ -3778,6 +3900,229 @@
           <a:chExt cx="0" cy="0"/>
         </a:xfrm>
       </p:grpSpPr>
+      <p:pic>
+        <p:nvPicPr>
+          <p:cNvPr id="3" name="Picture 2">
+            <a:extLst>
+              <a:ext uri="{FF2B5EF4-FFF2-40B4-BE49-F238E27FC236}">
+                <a16:creationId xmlns:a16="http://schemas.microsoft.com/office/drawing/2014/main" id="{A65147B0-66BF-49D3-B612-8B8BD39100F3}"/>
+              </a:ext>
+            </a:extLst>
+          </p:cNvPr>
+          <p:cNvPicPr>
+            <a:picLocks noChangeAspect="1"/>
+          </p:cNvPicPr>
+          <p:nvPr/>
+        </p:nvPicPr>
+        <p:blipFill>
+          <a:blip r:embed="rId2"/>
+          <a:stretch>
+            <a:fillRect/>
+          </a:stretch>
+        </p:blipFill>
+        <p:spPr>
+          <a:xfrm>
+            <a:off x="2606930" y="0"/>
+            <a:ext cx="6978140" cy="6858000"/>
+          </a:xfrm>
+          <a:prstGeom prst="rect">
+            <a:avLst/>
+          </a:prstGeom>
+        </p:spPr>
+      </p:pic>
+      <p:sp>
+        <p:nvSpPr>
+          <p:cNvPr id="4" name="Arrow: Right 3">
+            <a:extLst>
+              <a:ext uri="{FF2B5EF4-FFF2-40B4-BE49-F238E27FC236}">
+                <a16:creationId xmlns:a16="http://schemas.microsoft.com/office/drawing/2014/main" id="{ED6DF347-25AE-4319-A2EB-7EFD11E50A4F}"/>
+              </a:ext>
+            </a:extLst>
+          </p:cNvPr>
+          <p:cNvSpPr/>
+          <p:nvPr/>
+        </p:nvSpPr>
+        <p:spPr>
+          <a:xfrm rot="8944016">
+            <a:off x="3336142" y="4421894"/>
+            <a:ext cx="1071689" cy="420288"/>
+          </a:xfrm>
+          <a:prstGeom prst="rightArrow">
+            <a:avLst/>
+          </a:prstGeom>
+        </p:spPr>
+        <p:style>
+          <a:lnRef idx="2">
+            <a:schemeClr val="accent1">
+              <a:shade val="50000"/>
+            </a:schemeClr>
+          </a:lnRef>
+          <a:fillRef idx="1">
+            <a:schemeClr val="accent1"/>
+          </a:fillRef>
+          <a:effectRef idx="0">
+            <a:schemeClr val="accent1"/>
+          </a:effectRef>
+          <a:fontRef idx="minor">
+            <a:schemeClr val="lt1"/>
+          </a:fontRef>
+        </p:style>
+        <p:txBody>
+          <a:bodyPr rtlCol="0" anchor="ctr"/>
+          <a:lstStyle/>
+          <a:p>
+            <a:pPr algn="ctr"/>
+            <a:endParaRPr lang="en-SG"/>
+          </a:p>
+        </p:txBody>
+      </p:sp>
+      <p:sp>
+        <p:nvSpPr>
+          <p:cNvPr id="5" name="TextBox 4">
+            <a:extLst>
+              <a:ext uri="{FF2B5EF4-FFF2-40B4-BE49-F238E27FC236}">
+                <a16:creationId xmlns:a16="http://schemas.microsoft.com/office/drawing/2014/main" id="{F3DCC168-6047-4A10-B13F-D6285C024D8C}"/>
+              </a:ext>
+            </a:extLst>
+          </p:cNvPr>
+          <p:cNvSpPr txBox="1"/>
+          <p:nvPr/>
+        </p:nvSpPr>
+        <p:spPr>
+          <a:xfrm>
+            <a:off x="4439639" y="4176340"/>
+            <a:ext cx="4773551" cy="646331"/>
+          </a:xfrm>
+          <a:prstGeom prst="rect">
+            <a:avLst/>
+          </a:prstGeom>
+          <a:noFill/>
+        </p:spPr>
+        <p:txBody>
+          <a:bodyPr wrap="none" rtlCol="0">
+            <a:spAutoFit/>
+          </a:bodyPr>
+          <a:lstStyle/>
+          <a:p>
+            <a:r>
+              <a:rPr lang="en-SG" dirty="0">
+                <a:solidFill>
+                  <a:schemeClr val="bg1"/>
+                </a:solidFill>
+              </a:rPr>
+              <a:t>INDEX is not within the number of documents in </a:t>
+            </a:r>
+          </a:p>
+          <a:p>
+            <a:r>
+              <a:rPr lang="en-SG" dirty="0">
+                <a:solidFill>
+                  <a:schemeClr val="bg1"/>
+                </a:solidFill>
+              </a:rPr>
+              <a:t>PDF++</a:t>
+            </a:r>
+          </a:p>
+        </p:txBody>
+      </p:sp>
+      <p:sp>
+        <p:nvSpPr>
+          <p:cNvPr id="6" name="Oval 5">
+            <a:extLst>
+              <a:ext uri="{FF2B5EF4-FFF2-40B4-BE49-F238E27FC236}">
+                <a16:creationId xmlns:a16="http://schemas.microsoft.com/office/drawing/2014/main" id="{91E5D37C-A93E-4572-8297-3F16AD71F13E}"/>
+              </a:ext>
+            </a:extLst>
+          </p:cNvPr>
+          <p:cNvSpPr/>
+          <p:nvPr/>
+        </p:nvSpPr>
+        <p:spPr>
+          <a:xfrm>
+            <a:off x="2757377" y="1669847"/>
+            <a:ext cx="297712" cy="368596"/>
+          </a:xfrm>
+          <a:prstGeom prst="ellipse">
+            <a:avLst/>
+          </a:prstGeom>
+          <a:noFill/>
+          <a:ln w="76200">
+            <a:solidFill>
+              <a:schemeClr val="accent1"/>
+            </a:solidFill>
+          </a:ln>
+        </p:spPr>
+        <p:style>
+          <a:lnRef idx="2">
+            <a:schemeClr val="accent1">
+              <a:shade val="50000"/>
+            </a:schemeClr>
+          </a:lnRef>
+          <a:fillRef idx="1">
+            <a:schemeClr val="accent1"/>
+          </a:fillRef>
+          <a:effectRef idx="0">
+            <a:schemeClr val="accent1"/>
+          </a:effectRef>
+          <a:fontRef idx="minor">
+            <a:schemeClr val="lt1"/>
+          </a:fontRef>
+        </p:style>
+        <p:txBody>
+          <a:bodyPr rtlCol="0" anchor="ctr"/>
+          <a:lstStyle/>
+          <a:p>
+            <a:pPr algn="ctr"/>
+            <a:endParaRPr lang="en-SG"/>
+          </a:p>
+        </p:txBody>
+      </p:sp>
+      <p:sp>
+        <p:nvSpPr>
+          <p:cNvPr id="7" name="Arrow: Right 6">
+            <a:extLst>
+              <a:ext uri="{FF2B5EF4-FFF2-40B4-BE49-F238E27FC236}">
+                <a16:creationId xmlns:a16="http://schemas.microsoft.com/office/drawing/2014/main" id="{60BBBDB7-22FC-4236-974C-142E7BDC9D09}"/>
+              </a:ext>
+            </a:extLst>
+          </p:cNvPr>
+          <p:cNvSpPr/>
+          <p:nvPr/>
+        </p:nvSpPr>
+        <p:spPr>
+          <a:xfrm rot="13762576">
+            <a:off x="2642444" y="2859502"/>
+            <a:ext cx="2842360" cy="420288"/>
+          </a:xfrm>
+          <a:prstGeom prst="rightArrow">
+            <a:avLst/>
+          </a:prstGeom>
+        </p:spPr>
+        <p:style>
+          <a:lnRef idx="2">
+            <a:schemeClr val="accent1">
+              <a:shade val="50000"/>
+            </a:schemeClr>
+          </a:lnRef>
+          <a:fillRef idx="1">
+            <a:schemeClr val="accent1"/>
+          </a:fillRef>
+          <a:effectRef idx="0">
+            <a:schemeClr val="accent1"/>
+          </a:effectRef>
+          <a:fontRef idx="minor">
+            <a:schemeClr val="lt1"/>
+          </a:fontRef>
+        </p:style>
+        <p:txBody>
+          <a:bodyPr rtlCol="0" anchor="ctr"/>
+          <a:lstStyle/>
+          <a:p>
+            <a:pPr algn="ctr"/>
+            <a:endParaRPr lang="en-SG"/>
+          </a:p>
+        </p:txBody>
+      </p:sp>
     </p:spTree>
     <p:extLst>
       <p:ext uri="{BB962C8B-B14F-4D97-AF65-F5344CB8AC3E}">
@@ -3808,10 +4153,215 @@
           <a:chExt cx="0" cy="0"/>
         </a:xfrm>
       </p:grpSpPr>
+      <p:pic>
+        <p:nvPicPr>
+          <p:cNvPr id="2" name="Picture 1">
+            <a:extLst>
+              <a:ext uri="{FF2B5EF4-FFF2-40B4-BE49-F238E27FC236}">
+                <a16:creationId xmlns:a16="http://schemas.microsoft.com/office/drawing/2014/main" id="{8DAFD50E-F919-4E5C-A33B-9559A5D7BEA0}"/>
+              </a:ext>
+            </a:extLst>
+          </p:cNvPr>
+          <p:cNvPicPr>
+            <a:picLocks noChangeAspect="1"/>
+          </p:cNvPicPr>
+          <p:nvPr/>
+        </p:nvPicPr>
+        <p:blipFill>
+          <a:blip r:embed="rId2"/>
+          <a:stretch>
+            <a:fillRect/>
+          </a:stretch>
+        </p:blipFill>
+        <p:spPr>
+          <a:xfrm>
+            <a:off x="2594521" y="0"/>
+            <a:ext cx="7002958" cy="6858000"/>
+          </a:xfrm>
+          <a:prstGeom prst="rect">
+            <a:avLst/>
+          </a:prstGeom>
+        </p:spPr>
+      </p:pic>
+      <p:sp>
+        <p:nvSpPr>
+          <p:cNvPr id="3" name="Arrow: Right 2">
+            <a:extLst>
+              <a:ext uri="{FF2B5EF4-FFF2-40B4-BE49-F238E27FC236}">
+                <a16:creationId xmlns:a16="http://schemas.microsoft.com/office/drawing/2014/main" id="{294DD49E-9CF9-4656-A910-25C6B1CCD0E3}"/>
+              </a:ext>
+            </a:extLst>
+          </p:cNvPr>
+          <p:cNvSpPr/>
+          <p:nvPr/>
+        </p:nvSpPr>
+        <p:spPr>
+          <a:xfrm rot="12880423">
+            <a:off x="5398859" y="2774860"/>
+            <a:ext cx="1071689" cy="420288"/>
+          </a:xfrm>
+          <a:prstGeom prst="rightArrow">
+            <a:avLst/>
+          </a:prstGeom>
+        </p:spPr>
+        <p:style>
+          <a:lnRef idx="2">
+            <a:schemeClr val="accent1">
+              <a:shade val="50000"/>
+            </a:schemeClr>
+          </a:lnRef>
+          <a:fillRef idx="1">
+            <a:schemeClr val="accent1"/>
+          </a:fillRef>
+          <a:effectRef idx="0">
+            <a:schemeClr val="accent1"/>
+          </a:effectRef>
+          <a:fontRef idx="minor">
+            <a:schemeClr val="lt1"/>
+          </a:fontRef>
+        </p:style>
+        <p:txBody>
+          <a:bodyPr rtlCol="0" anchor="ctr"/>
+          <a:lstStyle/>
+          <a:p>
+            <a:pPr algn="ctr"/>
+            <a:endParaRPr lang="en-SG"/>
+          </a:p>
+        </p:txBody>
+      </p:sp>
+      <p:sp>
+        <p:nvSpPr>
+          <p:cNvPr id="4" name="TextBox 3">
+            <a:extLst>
+              <a:ext uri="{FF2B5EF4-FFF2-40B4-BE49-F238E27FC236}">
+                <a16:creationId xmlns:a16="http://schemas.microsoft.com/office/drawing/2014/main" id="{2F79EAA0-58E7-4F4D-952C-5CCCD5C90B28}"/>
+              </a:ext>
+            </a:extLst>
+          </p:cNvPr>
+          <p:cNvSpPr txBox="1"/>
+          <p:nvPr/>
+        </p:nvSpPr>
+        <p:spPr>
+          <a:xfrm>
+            <a:off x="5644662" y="3356346"/>
+            <a:ext cx="2790501" cy="646331"/>
+          </a:xfrm>
+          <a:prstGeom prst="rect">
+            <a:avLst/>
+          </a:prstGeom>
+          <a:noFill/>
+        </p:spPr>
+        <p:txBody>
+          <a:bodyPr wrap="square" rtlCol="0">
+            <a:spAutoFit/>
+          </a:bodyPr>
+          <a:lstStyle/>
+          <a:p>
+            <a:r>
+              <a:rPr lang="en-SG" dirty="0">
+                <a:solidFill>
+                  <a:schemeClr val="bg1"/>
+                </a:solidFill>
+              </a:rPr>
+              <a:t>This icon indicates that the file is an encrypted file</a:t>
+            </a:r>
+          </a:p>
+        </p:txBody>
+      </p:sp>
     </p:spTree>
     <p:extLst>
       <p:ext uri="{BB962C8B-B14F-4D97-AF65-F5344CB8AC3E}">
         <p14:creationId xmlns:p14="http://schemas.microsoft.com/office/powerpoint/2010/main" val="3128558686"/>
+      </p:ext>
+    </p:extLst>
+  </p:cSld>
+  <p:clrMapOvr>
+    <a:masterClrMapping/>
+  </p:clrMapOvr>
+</p:sld>
+</file>
+
+<file path=ppt/slides/slide7.xml><?xml version="1.0" encoding="utf-8"?>
+<p:sld xmlns:a="http://schemas.openxmlformats.org/drawingml/2006/main" xmlns:r="http://schemas.openxmlformats.org/officeDocument/2006/relationships" xmlns:p="http://schemas.openxmlformats.org/presentationml/2006/main">
+  <p:cSld>
+    <p:spTree>
+      <p:nvGrpSpPr>
+        <p:cNvPr id="1" name=""/>
+        <p:cNvGrpSpPr/>
+        <p:nvPr/>
+      </p:nvGrpSpPr>
+      <p:grpSpPr>
+        <a:xfrm>
+          <a:off x="0" y="0"/>
+          <a:ext cx="0" cy="0"/>
+          <a:chOff x="0" y="0"/>
+          <a:chExt cx="0" cy="0"/>
+        </a:xfrm>
+      </p:grpSpPr>
+      <p:pic>
+        <p:nvPicPr>
+          <p:cNvPr id="2" name="Picture 1">
+            <a:extLst>
+              <a:ext uri="{FF2B5EF4-FFF2-40B4-BE49-F238E27FC236}">
+                <a16:creationId xmlns:a16="http://schemas.microsoft.com/office/drawing/2014/main" id="{24BD7587-897F-4932-81A3-BA57522D3E9C}"/>
+              </a:ext>
+            </a:extLst>
+          </p:cNvPr>
+          <p:cNvPicPr>
+            <a:picLocks noChangeAspect="1"/>
+          </p:cNvPicPr>
+          <p:nvPr/>
+        </p:nvPicPr>
+        <p:blipFill>
+          <a:blip r:embed="rId2"/>
+          <a:stretch>
+            <a:fillRect/>
+          </a:stretch>
+        </p:blipFill>
+        <p:spPr>
+          <a:xfrm>
+            <a:off x="3545954" y="2710524"/>
+            <a:ext cx="5100091" cy="1436952"/>
+          </a:xfrm>
+          <a:prstGeom prst="rect">
+            <a:avLst/>
+          </a:prstGeom>
+        </p:spPr>
+      </p:pic>
+    </p:spTree>
+    <p:extLst>
+      <p:ext uri="{BB962C8B-B14F-4D97-AF65-F5344CB8AC3E}">
+        <p14:creationId xmlns:p14="http://schemas.microsoft.com/office/powerpoint/2010/main" val="2201011605"/>
+      </p:ext>
+    </p:extLst>
+  </p:cSld>
+  <p:clrMapOvr>
+    <a:masterClrMapping/>
+  </p:clrMapOvr>
+</p:sld>
+</file>
+
+<file path=ppt/slides/slide8.xml><?xml version="1.0" encoding="utf-8"?>
+<p:sld xmlns:a="http://schemas.openxmlformats.org/drawingml/2006/main" xmlns:r="http://schemas.openxmlformats.org/officeDocument/2006/relationships" xmlns:p="http://schemas.openxmlformats.org/presentationml/2006/main">
+  <p:cSld>
+    <p:spTree>
+      <p:nvGrpSpPr>
+        <p:cNvPr id="1" name=""/>
+        <p:cNvGrpSpPr/>
+        <p:nvPr/>
+      </p:nvGrpSpPr>
+      <p:grpSpPr>
+        <a:xfrm>
+          <a:off x="0" y="0"/>
+          <a:ext cx="0" cy="0"/>
+          <a:chOff x="0" y="0"/>
+          <a:chExt cx="0" cy="0"/>
+        </a:xfrm>
+      </p:grpSpPr>
+    </p:spTree>
+    <p:extLst>
+      <p:ext uri="{BB962C8B-B14F-4D97-AF65-F5344CB8AC3E}">
+        <p14:creationId xmlns:p14="http://schemas.microsoft.com/office/powerpoint/2010/main" val="2758758628"/>
       </p:ext>
     </p:extLst>
   </p:cSld>

</xml_diff>

<commit_message>
(v1.4) UG for FileProtection
Documentation on UG for FileProtection has been completed.
See: #214
</commit_message>
<xml_diff>
--- a/docs/diagrams/EncryptFeatureFileCheck.pptx
+++ b/docs/diagrams/EncryptFeatureFileCheck.pptx
@@ -12,6 +12,7 @@
     <p:sldId id="259" r:id="rId6"/>
     <p:sldId id="260" r:id="rId7"/>
     <p:sldId id="262" r:id="rId8"/>
+    <p:sldId id="263" r:id="rId9"/>
   </p:sldIdLst>
   <p:sldSz cx="12192000" cy="6858000"/>
   <p:notesSz cx="6858000" cy="9144000"/>
@@ -3652,9 +3653,9 @@
           <p:nvPr/>
         </p:nvSpPr>
         <p:spPr>
-          <a:xfrm rot="14979645">
-            <a:off x="4037894" y="5470974"/>
-            <a:ext cx="1071689" cy="420288"/>
+          <a:xfrm rot="13436360">
+            <a:off x="4181537" y="5286307"/>
+            <a:ext cx="805055" cy="420288"/>
           </a:xfrm>
           <a:prstGeom prst="rightArrow">
             <a:avLst/>
@@ -3699,7 +3700,7 @@
         </p:nvSpPr>
         <p:spPr>
           <a:xfrm>
-            <a:off x="4957029" y="5496452"/>
+            <a:off x="4886146" y="5624043"/>
             <a:ext cx="4431983" cy="369332"/>
           </a:xfrm>
           <a:prstGeom prst="rect">
@@ -4107,6 +4108,151 @@
     <p:extLst>
       <p:ext uri="{BB962C8B-B14F-4D97-AF65-F5344CB8AC3E}">
         <p14:creationId xmlns:p14="http://schemas.microsoft.com/office/powerpoint/2010/main" val="3047272358"/>
+      </p:ext>
+    </p:extLst>
+  </p:cSld>
+  <p:clrMapOvr>
+    <a:masterClrMapping/>
+  </p:clrMapOvr>
+</p:sld>
+</file>
+
+<file path=ppt/slides/slide8.xml><?xml version="1.0" encoding="utf-8"?>
+<p:sld xmlns:a="http://schemas.openxmlformats.org/drawingml/2006/main" xmlns:r="http://schemas.openxmlformats.org/officeDocument/2006/relationships" xmlns:p="http://schemas.openxmlformats.org/presentationml/2006/main">
+  <p:cSld>
+    <p:spTree>
+      <p:nvGrpSpPr>
+        <p:cNvPr id="1" name=""/>
+        <p:cNvGrpSpPr/>
+        <p:nvPr/>
+      </p:nvGrpSpPr>
+      <p:grpSpPr>
+        <a:xfrm>
+          <a:off x="0" y="0"/>
+          <a:ext cx="0" cy="0"/>
+          <a:chOff x="0" y="0"/>
+          <a:chExt cx="0" cy="0"/>
+        </a:xfrm>
+      </p:grpSpPr>
+      <p:pic>
+        <p:nvPicPr>
+          <p:cNvPr id="4" name="Picture 3">
+            <a:extLst>
+              <a:ext uri="{FF2B5EF4-FFF2-40B4-BE49-F238E27FC236}">
+                <a16:creationId xmlns:a16="http://schemas.microsoft.com/office/drawing/2014/main" id="{0BCE959F-8F5D-47DC-B576-337DF467E559}"/>
+              </a:ext>
+            </a:extLst>
+          </p:cNvPr>
+          <p:cNvPicPr>
+            <a:picLocks noChangeAspect="1"/>
+          </p:cNvPicPr>
+          <p:nvPr/>
+        </p:nvPicPr>
+        <p:blipFill>
+          <a:blip r:embed="rId2"/>
+          <a:stretch>
+            <a:fillRect/>
+          </a:stretch>
+        </p:blipFill>
+        <p:spPr>
+          <a:xfrm>
+            <a:off x="2291343" y="2332235"/>
+            <a:ext cx="7609313" cy="2193529"/>
+          </a:xfrm>
+          <a:prstGeom prst="rect">
+            <a:avLst/>
+          </a:prstGeom>
+        </p:spPr>
+      </p:pic>
+      <p:sp>
+        <p:nvSpPr>
+          <p:cNvPr id="5" name="Arrow: Right 4">
+            <a:extLst>
+              <a:ext uri="{FF2B5EF4-FFF2-40B4-BE49-F238E27FC236}">
+                <a16:creationId xmlns:a16="http://schemas.microsoft.com/office/drawing/2014/main" id="{B664140C-DAC4-42B6-BD9F-783028D2899B}"/>
+              </a:ext>
+            </a:extLst>
+          </p:cNvPr>
+          <p:cNvSpPr/>
+          <p:nvPr/>
+        </p:nvSpPr>
+        <p:spPr>
+          <a:xfrm rot="11678075">
+            <a:off x="3975975" y="2544498"/>
+            <a:ext cx="805055" cy="420288"/>
+          </a:xfrm>
+          <a:prstGeom prst="rightArrow">
+            <a:avLst/>
+          </a:prstGeom>
+        </p:spPr>
+        <p:style>
+          <a:lnRef idx="2">
+            <a:schemeClr val="accent1">
+              <a:shade val="50000"/>
+            </a:schemeClr>
+          </a:lnRef>
+          <a:fillRef idx="1">
+            <a:schemeClr val="accent1"/>
+          </a:fillRef>
+          <a:effectRef idx="0">
+            <a:schemeClr val="accent1"/>
+          </a:effectRef>
+          <a:fontRef idx="minor">
+            <a:schemeClr val="lt1"/>
+          </a:fontRef>
+        </p:style>
+        <p:txBody>
+          <a:bodyPr rtlCol="0" anchor="ctr"/>
+          <a:lstStyle/>
+          <a:p>
+            <a:pPr algn="ctr"/>
+            <a:endParaRPr lang="en-SG"/>
+          </a:p>
+        </p:txBody>
+      </p:sp>
+      <p:sp>
+        <p:nvSpPr>
+          <p:cNvPr id="6" name="TextBox 5">
+            <a:extLst>
+              <a:ext uri="{FF2B5EF4-FFF2-40B4-BE49-F238E27FC236}">
+                <a16:creationId xmlns:a16="http://schemas.microsoft.com/office/drawing/2014/main" id="{7C75D647-D1B6-421B-ADE7-8E5AA6C7DA69}"/>
+              </a:ext>
+            </a:extLst>
+          </p:cNvPr>
+          <p:cNvSpPr txBox="1"/>
+          <p:nvPr/>
+        </p:nvSpPr>
+        <p:spPr>
+          <a:xfrm>
+            <a:off x="4744379" y="2826474"/>
+            <a:ext cx="2246128" cy="369332"/>
+          </a:xfrm>
+          <a:prstGeom prst="rect">
+            <a:avLst/>
+          </a:prstGeom>
+          <a:noFill/>
+        </p:spPr>
+        <p:txBody>
+          <a:bodyPr wrap="none" rtlCol="0">
+            <a:spAutoFit/>
+          </a:bodyPr>
+          <a:lstStyle/>
+          <a:p>
+            <a:r>
+              <a:rPr lang="en-SG" dirty="0">
+                <a:solidFill>
+                  <a:schemeClr val="bg1"/>
+                </a:solidFill>
+              </a:rPr>
+              <a:t>No password or space</a:t>
+            </a:r>
+          </a:p>
+        </p:txBody>
+      </p:sp>
+    </p:spTree>
+    <p:extLst>
+      <p:ext uri="{BB962C8B-B14F-4D97-AF65-F5344CB8AC3E}">
+        <p14:creationId xmlns:p14="http://schemas.microsoft.com/office/powerpoint/2010/main" val="2989294775"/>
       </p:ext>
     </p:extLst>
   </p:cSld>

</xml_diff>